<commit_message>
Class name mistake - fixed
</commit_message>
<xml_diff>
--- a/OtherStuff/Code Inspection Presentation.pptx
+++ b/OtherStuff/Code Inspection Presentation.pptx
@@ -273,7 +273,7 @@
           <a:p>
             <a:fld id="{07CEF1F6-5A86-4791-8874-D64862DF8FAA}" type="datetimeFigureOut">
               <a:rPr lang="en-US" smtClean="0"/>
-              <a:t>1/2/2016</a:t>
+              <a:t>1/5/2016</a:t>
             </a:fld>
             <a:endParaRPr lang="en-US"/>
           </a:p>
@@ -443,7 +443,7 @@
           <a:p>
             <a:fld id="{07CEF1F6-5A86-4791-8874-D64862DF8FAA}" type="datetimeFigureOut">
               <a:rPr lang="en-US" smtClean="0"/>
-              <a:t>1/2/2016</a:t>
+              <a:t>1/5/2016</a:t>
             </a:fld>
             <a:endParaRPr lang="en-US"/>
           </a:p>
@@ -623,7 +623,7 @@
           <a:p>
             <a:fld id="{07CEF1F6-5A86-4791-8874-D64862DF8FAA}" type="datetimeFigureOut">
               <a:rPr lang="en-US" smtClean="0"/>
-              <a:t>1/2/2016</a:t>
+              <a:t>1/5/2016</a:t>
             </a:fld>
             <a:endParaRPr lang="en-US"/>
           </a:p>
@@ -793,7 +793,7 @@
           <a:p>
             <a:fld id="{07CEF1F6-5A86-4791-8874-D64862DF8FAA}" type="datetimeFigureOut">
               <a:rPr lang="en-US" smtClean="0"/>
-              <a:t>1/2/2016</a:t>
+              <a:t>1/5/2016</a:t>
             </a:fld>
             <a:endParaRPr lang="en-US"/>
           </a:p>
@@ -1039,7 +1039,7 @@
           <a:p>
             <a:fld id="{07CEF1F6-5A86-4791-8874-D64862DF8FAA}" type="datetimeFigureOut">
               <a:rPr lang="en-US" smtClean="0"/>
-              <a:t>1/2/2016</a:t>
+              <a:t>1/5/2016</a:t>
             </a:fld>
             <a:endParaRPr lang="en-US"/>
           </a:p>
@@ -1271,7 +1271,7 @@
           <a:p>
             <a:fld id="{07CEF1F6-5A86-4791-8874-D64862DF8FAA}" type="datetimeFigureOut">
               <a:rPr lang="en-US" smtClean="0"/>
-              <a:t>1/2/2016</a:t>
+              <a:t>1/5/2016</a:t>
             </a:fld>
             <a:endParaRPr lang="en-US"/>
           </a:p>
@@ -1638,7 +1638,7 @@
           <a:p>
             <a:fld id="{07CEF1F6-5A86-4791-8874-D64862DF8FAA}" type="datetimeFigureOut">
               <a:rPr lang="en-US" smtClean="0"/>
-              <a:t>1/2/2016</a:t>
+              <a:t>1/5/2016</a:t>
             </a:fld>
             <a:endParaRPr lang="en-US"/>
           </a:p>
@@ -1756,7 +1756,7 @@
           <a:p>
             <a:fld id="{07CEF1F6-5A86-4791-8874-D64862DF8FAA}" type="datetimeFigureOut">
               <a:rPr lang="en-US" smtClean="0"/>
-              <a:t>1/2/2016</a:t>
+              <a:t>1/5/2016</a:t>
             </a:fld>
             <a:endParaRPr lang="en-US"/>
           </a:p>
@@ -1851,7 +1851,7 @@
           <a:p>
             <a:fld id="{07CEF1F6-5A86-4791-8874-D64862DF8FAA}" type="datetimeFigureOut">
               <a:rPr lang="en-US" smtClean="0"/>
-              <a:t>1/2/2016</a:t>
+              <a:t>1/5/2016</a:t>
             </a:fld>
             <a:endParaRPr lang="en-US"/>
           </a:p>
@@ -2128,7 +2128,7 @@
           <a:p>
             <a:fld id="{07CEF1F6-5A86-4791-8874-D64862DF8FAA}" type="datetimeFigureOut">
               <a:rPr lang="en-US" smtClean="0"/>
-              <a:t>1/2/2016</a:t>
+              <a:t>1/5/2016</a:t>
             </a:fld>
             <a:endParaRPr lang="en-US"/>
           </a:p>
@@ -2381,7 +2381,7 @@
           <a:p>
             <a:fld id="{07CEF1F6-5A86-4791-8874-D64862DF8FAA}" type="datetimeFigureOut">
               <a:rPr lang="en-US" smtClean="0"/>
-              <a:t>1/2/2016</a:t>
+              <a:t>1/5/2016</a:t>
             </a:fld>
             <a:endParaRPr lang="en-US"/>
           </a:p>
@@ -2594,7 +2594,7 @@
           <a:p>
             <a:fld id="{07CEF1F6-5A86-4791-8874-D64862DF8FAA}" type="datetimeFigureOut">
               <a:rPr lang="en-US" smtClean="0"/>
-              <a:t>1/2/2016</a:t>
+              <a:t>1/5/2016</a:t>
             </a:fld>
             <a:endParaRPr lang="en-US"/>
           </a:p>
@@ -20433,13 +20433,19 @@
               <a:t>in </a:t>
             </a:r>
             <a:r>
-              <a:rPr lang="it-IT" sz="2933" i="1" dirty="0" err="1">
-                <a:latin typeface="Cambria" panose="02040503050406030204" pitchFamily="18" charset="0"/>
-              </a:rPr>
-              <a:t>CallbackInterceptor</a:t>
-            </a:r>
-            <a:r>
-              <a:rPr lang="it-IT" sz="2933" i="1" dirty="0">
+              <a:rPr lang="it-IT" sz="2933" i="1" dirty="0" err="1" smtClean="0">
+                <a:latin typeface="Cambria" panose="02040503050406030204" pitchFamily="18" charset="0"/>
+              </a:rPr>
+              <a:t>Bean</a:t>
+            </a:r>
+            <a:r>
+              <a:rPr lang="it-IT" sz="2933" i="1" dirty="0" err="1" smtClean="0">
+                <a:latin typeface="Cambria" panose="02040503050406030204" pitchFamily="18" charset="0"/>
+              </a:rPr>
+              <a:t>AroundInvokeInterceptor</a:t>
+            </a:r>
+            <a:r>
+              <a:rPr lang="it-IT" sz="2933" i="1" dirty="0" smtClean="0">
                 <a:latin typeface="Cambria" panose="02040503050406030204" pitchFamily="18" charset="0"/>
               </a:rPr>
               <a:t> </a:t>

</xml_diff>